<commit_message>
figure 1 et analyses sup
</commit_message>
<xml_diff>
--- a/06_Figures/Figures.pptx
+++ b/06_Figures/Figures.pptx
@@ -8,6 +8,7 @@
     <p:sldId id="256" r:id="rId2"/>
     <p:sldId id="257" r:id="rId3"/>
     <p:sldId id="258" r:id="rId4"/>
+    <p:sldId id="259" r:id="rId5"/>
   </p:sldIdLst>
   <p:sldSz cx="9144000" cy="6858000" type="screen4x3"/>
   <p:notesSz cx="6858000" cy="9144000"/>
@@ -245,7 +246,7 @@
           <a:p>
             <a:fld id="{3FF39126-F987-48DB-9EEF-9CD00B9E823D}" type="datetimeFigureOut">
               <a:rPr lang="fr-FR" smtClean="0"/>
-              <a:t>20/10/2022</a:t>
+              <a:t>21/10/2022</a:t>
             </a:fld>
             <a:endParaRPr lang="fr-FR"/>
           </a:p>
@@ -415,7 +416,7 @@
           <a:p>
             <a:fld id="{3FF39126-F987-48DB-9EEF-9CD00B9E823D}" type="datetimeFigureOut">
               <a:rPr lang="fr-FR" smtClean="0"/>
-              <a:t>20/10/2022</a:t>
+              <a:t>21/10/2022</a:t>
             </a:fld>
             <a:endParaRPr lang="fr-FR"/>
           </a:p>
@@ -595,7 +596,7 @@
           <a:p>
             <a:fld id="{3FF39126-F987-48DB-9EEF-9CD00B9E823D}" type="datetimeFigureOut">
               <a:rPr lang="fr-FR" smtClean="0"/>
-              <a:t>20/10/2022</a:t>
+              <a:t>21/10/2022</a:t>
             </a:fld>
             <a:endParaRPr lang="fr-FR"/>
           </a:p>
@@ -765,7 +766,7 @@
           <a:p>
             <a:fld id="{3FF39126-F987-48DB-9EEF-9CD00B9E823D}" type="datetimeFigureOut">
               <a:rPr lang="fr-FR" smtClean="0"/>
-              <a:t>20/10/2022</a:t>
+              <a:t>21/10/2022</a:t>
             </a:fld>
             <a:endParaRPr lang="fr-FR"/>
           </a:p>
@@ -1009,7 +1010,7 @@
           <a:p>
             <a:fld id="{3FF39126-F987-48DB-9EEF-9CD00B9E823D}" type="datetimeFigureOut">
               <a:rPr lang="fr-FR" smtClean="0"/>
-              <a:t>20/10/2022</a:t>
+              <a:t>21/10/2022</a:t>
             </a:fld>
             <a:endParaRPr lang="fr-FR"/>
           </a:p>
@@ -1241,7 +1242,7 @@
           <a:p>
             <a:fld id="{3FF39126-F987-48DB-9EEF-9CD00B9E823D}" type="datetimeFigureOut">
               <a:rPr lang="fr-FR" smtClean="0"/>
-              <a:t>20/10/2022</a:t>
+              <a:t>21/10/2022</a:t>
             </a:fld>
             <a:endParaRPr lang="fr-FR"/>
           </a:p>
@@ -1608,7 +1609,7 @@
           <a:p>
             <a:fld id="{3FF39126-F987-48DB-9EEF-9CD00B9E823D}" type="datetimeFigureOut">
               <a:rPr lang="fr-FR" smtClean="0"/>
-              <a:t>20/10/2022</a:t>
+              <a:t>21/10/2022</a:t>
             </a:fld>
             <a:endParaRPr lang="fr-FR"/>
           </a:p>
@@ -1726,7 +1727,7 @@
           <a:p>
             <a:fld id="{3FF39126-F987-48DB-9EEF-9CD00B9E823D}" type="datetimeFigureOut">
               <a:rPr lang="fr-FR" smtClean="0"/>
-              <a:t>20/10/2022</a:t>
+              <a:t>21/10/2022</a:t>
             </a:fld>
             <a:endParaRPr lang="fr-FR"/>
           </a:p>
@@ -1821,7 +1822,7 @@
           <a:p>
             <a:fld id="{3FF39126-F987-48DB-9EEF-9CD00B9E823D}" type="datetimeFigureOut">
               <a:rPr lang="fr-FR" smtClean="0"/>
-              <a:t>20/10/2022</a:t>
+              <a:t>21/10/2022</a:t>
             </a:fld>
             <a:endParaRPr lang="fr-FR"/>
           </a:p>
@@ -2098,7 +2099,7 @@
           <a:p>
             <a:fld id="{3FF39126-F987-48DB-9EEF-9CD00B9E823D}" type="datetimeFigureOut">
               <a:rPr lang="fr-FR" smtClean="0"/>
-              <a:t>20/10/2022</a:t>
+              <a:t>21/10/2022</a:t>
             </a:fld>
             <a:endParaRPr lang="fr-FR"/>
           </a:p>
@@ -2355,7 +2356,7 @@
           <a:p>
             <a:fld id="{3FF39126-F987-48DB-9EEF-9CD00B9E823D}" type="datetimeFigureOut">
               <a:rPr lang="fr-FR" smtClean="0"/>
-              <a:t>20/10/2022</a:t>
+              <a:t>21/10/2022</a:t>
             </a:fld>
             <a:endParaRPr lang="fr-FR"/>
           </a:p>
@@ -2568,7 +2569,7 @@
           <a:p>
             <a:fld id="{3FF39126-F987-48DB-9EEF-9CD00B9E823D}" type="datetimeFigureOut">
               <a:rPr lang="fr-FR" smtClean="0"/>
-              <a:t>20/10/2022</a:t>
+              <a:t>21/10/2022</a:t>
             </a:fld>
             <a:endParaRPr lang="fr-FR"/>
           </a:p>
@@ -4406,10 +4407,10 @@
         </p:nvGrpSpPr>
         <p:grpSpPr>
           <a:xfrm>
-            <a:off x="117440" y="-2336454"/>
-            <a:ext cx="8923428" cy="9338147"/>
+            <a:off x="136490" y="-2393604"/>
+            <a:ext cx="8923428" cy="9214380"/>
             <a:chOff x="117440" y="-2336454"/>
-            <a:chExt cx="8923428" cy="9338147"/>
+            <a:chExt cx="8923428" cy="9214380"/>
           </a:xfrm>
         </p:grpSpPr>
         <p:grpSp>
@@ -4421,9 +4422,9 @@
           <p:grpSpPr>
             <a:xfrm>
               <a:off x="117440" y="-2336454"/>
-              <a:ext cx="8923428" cy="9338147"/>
+              <a:ext cx="8923428" cy="9214380"/>
               <a:chOff x="117440" y="-2336454"/>
-              <a:chExt cx="8923428" cy="9338147"/>
+              <a:chExt cx="8923428" cy="9214380"/>
             </a:xfrm>
           </p:grpSpPr>
           <p:pic>
@@ -4570,7 +4571,7 @@
             </p:blipFill>
             <p:spPr>
               <a:xfrm>
-                <a:off x="2530989" y="6531046"/>
+                <a:off x="2530989" y="6407279"/>
                 <a:ext cx="4289612" cy="470647"/>
               </a:xfrm>
               <a:prstGeom prst="rect">
@@ -4724,10 +4725,1941 @@
           </p:txBody>
         </p:sp>
       </p:grpSp>
+      <p:grpSp>
+        <p:nvGrpSpPr>
+          <p:cNvPr id="9" name="Groupe 8"/>
+          <p:cNvGrpSpPr/>
+          <p:nvPr/>
+        </p:nvGrpSpPr>
+        <p:grpSpPr>
+          <a:xfrm>
+            <a:off x="1334981" y="6924675"/>
+            <a:ext cx="7600711" cy="490628"/>
+            <a:chOff x="1181339" y="6824808"/>
+            <a:chExt cx="7600711" cy="490628"/>
+          </a:xfrm>
+        </p:grpSpPr>
+        <p:grpSp>
+          <p:nvGrpSpPr>
+            <p:cNvPr id="6" name="Groupe 5"/>
+            <p:cNvGrpSpPr/>
+            <p:nvPr/>
+          </p:nvGrpSpPr>
+          <p:grpSpPr>
+            <a:xfrm>
+              <a:off x="1181339" y="6824808"/>
+              <a:ext cx="3508187" cy="490628"/>
+              <a:chOff x="1276589" y="6796233"/>
+              <a:chExt cx="3508187" cy="490628"/>
+            </a:xfrm>
+          </p:grpSpPr>
+          <p:sp>
+            <p:nvSpPr>
+              <p:cNvPr id="4" name="Ellipse 3"/>
+              <p:cNvSpPr/>
+              <p:nvPr/>
+            </p:nvSpPr>
+            <p:spPr>
+              <a:xfrm>
+                <a:off x="1276589" y="6877926"/>
+                <a:ext cx="108000" cy="108000"/>
+              </a:xfrm>
+              <a:prstGeom prst="ellipse">
+                <a:avLst/>
+              </a:prstGeom>
+              <a:solidFill>
+                <a:srgbClr val="FDE725"/>
+              </a:solidFill>
+              <a:ln>
+                <a:solidFill>
+                  <a:schemeClr val="tx1"/>
+                </a:solidFill>
+              </a:ln>
+            </p:spPr>
+            <p:style>
+              <a:lnRef idx="2">
+                <a:schemeClr val="accent1">
+                  <a:shade val="50000"/>
+                </a:schemeClr>
+              </a:lnRef>
+              <a:fillRef idx="1">
+                <a:schemeClr val="accent1"/>
+              </a:fillRef>
+              <a:effectRef idx="0">
+                <a:schemeClr val="accent1"/>
+              </a:effectRef>
+              <a:fontRef idx="minor">
+                <a:schemeClr val="lt1"/>
+              </a:fontRef>
+            </p:style>
+            <p:txBody>
+              <a:bodyPr rtlCol="0" anchor="ctr"/>
+              <a:lstStyle/>
+              <a:p>
+                <a:pPr algn="ctr"/>
+                <a:endParaRPr lang="fr-FR"/>
+              </a:p>
+            </p:txBody>
+          </p:sp>
+          <p:sp>
+            <p:nvSpPr>
+              <p:cNvPr id="19" name="Ellipse 18"/>
+              <p:cNvSpPr/>
+              <p:nvPr/>
+            </p:nvSpPr>
+            <p:spPr>
+              <a:xfrm>
+                <a:off x="1276589" y="7100226"/>
+                <a:ext cx="108000" cy="108000"/>
+              </a:xfrm>
+              <a:prstGeom prst="ellipse">
+                <a:avLst/>
+              </a:prstGeom>
+              <a:solidFill>
+                <a:srgbClr val="20A387"/>
+              </a:solidFill>
+              <a:ln>
+                <a:solidFill>
+                  <a:schemeClr val="tx1"/>
+                </a:solidFill>
+              </a:ln>
+            </p:spPr>
+            <p:style>
+              <a:lnRef idx="2">
+                <a:schemeClr val="accent1">
+                  <a:shade val="50000"/>
+                </a:schemeClr>
+              </a:lnRef>
+              <a:fillRef idx="1">
+                <a:schemeClr val="accent1"/>
+              </a:fillRef>
+              <a:effectRef idx="0">
+                <a:schemeClr val="accent1"/>
+              </a:effectRef>
+              <a:fontRef idx="minor">
+                <a:schemeClr val="lt1"/>
+              </a:fontRef>
+            </p:style>
+            <p:txBody>
+              <a:bodyPr rtlCol="0" anchor="ctr"/>
+              <a:lstStyle/>
+              <a:p>
+                <a:pPr algn="ctr"/>
+                <a:endParaRPr lang="fr-FR"/>
+              </a:p>
+            </p:txBody>
+          </p:sp>
+          <p:sp>
+            <p:nvSpPr>
+              <p:cNvPr id="20" name="Ellipse 19"/>
+              <p:cNvSpPr/>
+              <p:nvPr/>
+            </p:nvSpPr>
+            <p:spPr>
+              <a:xfrm>
+                <a:off x="2886074" y="6877926"/>
+                <a:ext cx="108000" cy="108000"/>
+              </a:xfrm>
+              <a:prstGeom prst="ellipse">
+                <a:avLst/>
+              </a:prstGeom>
+              <a:solidFill>
+                <a:srgbClr val="B40F20"/>
+              </a:solidFill>
+              <a:ln>
+                <a:solidFill>
+                  <a:schemeClr val="tx1"/>
+                </a:solidFill>
+              </a:ln>
+            </p:spPr>
+            <p:style>
+              <a:lnRef idx="2">
+                <a:schemeClr val="accent1">
+                  <a:shade val="50000"/>
+                </a:schemeClr>
+              </a:lnRef>
+              <a:fillRef idx="1">
+                <a:schemeClr val="accent1"/>
+              </a:fillRef>
+              <a:effectRef idx="0">
+                <a:schemeClr val="accent1"/>
+              </a:effectRef>
+              <a:fontRef idx="minor">
+                <a:schemeClr val="lt1"/>
+              </a:fontRef>
+            </p:style>
+            <p:txBody>
+              <a:bodyPr rtlCol="0" anchor="ctr"/>
+              <a:lstStyle/>
+              <a:p>
+                <a:pPr algn="ctr"/>
+                <a:endParaRPr lang="fr-FR"/>
+              </a:p>
+            </p:txBody>
+          </p:sp>
+          <p:sp>
+            <p:nvSpPr>
+              <p:cNvPr id="21" name="Ellipse 20"/>
+              <p:cNvSpPr/>
+              <p:nvPr/>
+            </p:nvSpPr>
+            <p:spPr>
+              <a:xfrm>
+                <a:off x="2886074" y="7100226"/>
+                <a:ext cx="108000" cy="108000"/>
+              </a:xfrm>
+              <a:prstGeom prst="ellipse">
+                <a:avLst/>
+              </a:prstGeom>
+              <a:solidFill>
+                <a:srgbClr val="440154"/>
+              </a:solidFill>
+              <a:ln>
+                <a:solidFill>
+                  <a:schemeClr val="tx1"/>
+                </a:solidFill>
+              </a:ln>
+            </p:spPr>
+            <p:style>
+              <a:lnRef idx="2">
+                <a:schemeClr val="accent1">
+                  <a:shade val="50000"/>
+                </a:schemeClr>
+              </a:lnRef>
+              <a:fillRef idx="1">
+                <a:schemeClr val="accent1"/>
+              </a:fillRef>
+              <a:effectRef idx="0">
+                <a:schemeClr val="accent1"/>
+              </a:effectRef>
+              <a:fontRef idx="minor">
+                <a:schemeClr val="lt1"/>
+              </a:fontRef>
+            </p:style>
+            <p:txBody>
+              <a:bodyPr rtlCol="0" anchor="ctr"/>
+              <a:lstStyle/>
+              <a:p>
+                <a:pPr algn="ctr"/>
+                <a:endParaRPr lang="fr-FR"/>
+              </a:p>
+            </p:txBody>
+          </p:sp>
+          <p:sp>
+            <p:nvSpPr>
+              <p:cNvPr id="5" name="ZoneTexte 4"/>
+              <p:cNvSpPr txBox="1"/>
+              <p:nvPr/>
+            </p:nvSpPr>
+            <p:spPr>
+              <a:xfrm>
+                <a:off x="1336964" y="7025251"/>
+                <a:ext cx="1832723" cy="261610"/>
+              </a:xfrm>
+              <a:prstGeom prst="rect">
+                <a:avLst/>
+              </a:prstGeom>
+              <a:noFill/>
+            </p:spPr>
+            <p:txBody>
+              <a:bodyPr wrap="square" rtlCol="0">
+                <a:spAutoFit/>
+              </a:bodyPr>
+              <a:lstStyle/>
+              <a:p>
+                <a:r>
+                  <a:rPr lang="fr-FR" sz="1100" b="1" dirty="0" err="1" smtClean="0">
+                    <a:latin typeface="Arial" panose="020B0604020202020204" pitchFamily="34" charset="0"/>
+                    <a:cs typeface="Arial" panose="020B0604020202020204" pitchFamily="34" charset="0"/>
+                  </a:rPr>
+                  <a:t>Seamount</a:t>
+                </a:r>
+                <a:r>
+                  <a:rPr lang="fr-FR" sz="1100" b="1" dirty="0" smtClean="0">
+                    <a:latin typeface="Arial" panose="020B0604020202020204" pitchFamily="34" charset="0"/>
+                    <a:cs typeface="Arial" panose="020B0604020202020204" pitchFamily="34" charset="0"/>
+                  </a:rPr>
+                  <a:t> ~50m</a:t>
+                </a:r>
+                <a:endParaRPr lang="fr-FR" sz="1100" b="1" dirty="0">
+                  <a:latin typeface="Arial" panose="020B0604020202020204" pitchFamily="34" charset="0"/>
+                  <a:cs typeface="Arial" panose="020B0604020202020204" pitchFamily="34" charset="0"/>
+                </a:endParaRPr>
+              </a:p>
+            </p:txBody>
+          </p:sp>
+          <p:sp>
+            <p:nvSpPr>
+              <p:cNvPr id="22" name="ZoneTexte 21"/>
+              <p:cNvSpPr txBox="1"/>
+              <p:nvPr/>
+            </p:nvSpPr>
+            <p:spPr>
+              <a:xfrm>
+                <a:off x="2952053" y="6801121"/>
+                <a:ext cx="1832723" cy="261610"/>
+              </a:xfrm>
+              <a:prstGeom prst="rect">
+                <a:avLst/>
+              </a:prstGeom>
+              <a:noFill/>
+            </p:spPr>
+            <p:txBody>
+              <a:bodyPr wrap="square" rtlCol="0">
+                <a:spAutoFit/>
+              </a:bodyPr>
+              <a:lstStyle/>
+              <a:p>
+                <a:r>
+                  <a:rPr lang="fr-FR" sz="1100" b="1" dirty="0" err="1" smtClean="0">
+                    <a:latin typeface="Arial" panose="020B0604020202020204" pitchFamily="34" charset="0"/>
+                    <a:cs typeface="Arial" panose="020B0604020202020204" pitchFamily="34" charset="0"/>
+                  </a:rPr>
+                  <a:t>Seamount</a:t>
+                </a:r>
+                <a:r>
+                  <a:rPr lang="fr-FR" sz="1100" b="1" dirty="0" smtClean="0">
+                    <a:latin typeface="Arial" panose="020B0604020202020204" pitchFamily="34" charset="0"/>
+                    <a:cs typeface="Arial" panose="020B0604020202020204" pitchFamily="34" charset="0"/>
+                  </a:rPr>
+                  <a:t> ~250m</a:t>
+                </a:r>
+                <a:endParaRPr lang="fr-FR" sz="1100" b="1" dirty="0">
+                  <a:latin typeface="Arial" panose="020B0604020202020204" pitchFamily="34" charset="0"/>
+                  <a:cs typeface="Arial" panose="020B0604020202020204" pitchFamily="34" charset="0"/>
+                </a:endParaRPr>
+              </a:p>
+            </p:txBody>
+          </p:sp>
+          <p:sp>
+            <p:nvSpPr>
+              <p:cNvPr id="23" name="ZoneTexte 22"/>
+              <p:cNvSpPr txBox="1"/>
+              <p:nvPr/>
+            </p:nvSpPr>
+            <p:spPr>
+              <a:xfrm>
+                <a:off x="2952053" y="7022365"/>
+                <a:ext cx="1832723" cy="261610"/>
+              </a:xfrm>
+              <a:prstGeom prst="rect">
+                <a:avLst/>
+              </a:prstGeom>
+              <a:noFill/>
+            </p:spPr>
+            <p:txBody>
+              <a:bodyPr wrap="square" rtlCol="0">
+                <a:spAutoFit/>
+              </a:bodyPr>
+              <a:lstStyle/>
+              <a:p>
+                <a:r>
+                  <a:rPr lang="fr-FR" sz="1100" b="1" dirty="0" err="1" smtClean="0">
+                    <a:latin typeface="Arial" panose="020B0604020202020204" pitchFamily="34" charset="0"/>
+                    <a:cs typeface="Arial" panose="020B0604020202020204" pitchFamily="34" charset="0"/>
+                  </a:rPr>
+                  <a:t>Seamount</a:t>
+                </a:r>
+                <a:r>
+                  <a:rPr lang="fr-FR" sz="1100" b="1" dirty="0" smtClean="0">
+                    <a:latin typeface="Arial" panose="020B0604020202020204" pitchFamily="34" charset="0"/>
+                    <a:cs typeface="Arial" panose="020B0604020202020204" pitchFamily="34" charset="0"/>
+                  </a:rPr>
+                  <a:t> ~500m</a:t>
+                </a:r>
+                <a:endParaRPr lang="fr-FR" sz="1100" b="1" dirty="0">
+                  <a:latin typeface="Arial" panose="020B0604020202020204" pitchFamily="34" charset="0"/>
+                  <a:cs typeface="Arial" panose="020B0604020202020204" pitchFamily="34" charset="0"/>
+                </a:endParaRPr>
+              </a:p>
+            </p:txBody>
+          </p:sp>
+          <p:sp>
+            <p:nvSpPr>
+              <p:cNvPr id="24" name="ZoneTexte 23"/>
+              <p:cNvSpPr txBox="1"/>
+              <p:nvPr/>
+            </p:nvSpPr>
+            <p:spPr>
+              <a:xfrm>
+                <a:off x="1336964" y="6796233"/>
+                <a:ext cx="1832723" cy="261610"/>
+              </a:xfrm>
+              <a:prstGeom prst="rect">
+                <a:avLst/>
+              </a:prstGeom>
+              <a:noFill/>
+            </p:spPr>
+            <p:txBody>
+              <a:bodyPr wrap="square" rtlCol="0">
+                <a:spAutoFit/>
+              </a:bodyPr>
+              <a:lstStyle/>
+              <a:p>
+                <a:r>
+                  <a:rPr lang="fr-FR" sz="1100" b="1" dirty="0" err="1" smtClean="0">
+                    <a:latin typeface="Arial" panose="020B0604020202020204" pitchFamily="34" charset="0"/>
+                    <a:cs typeface="Arial" panose="020B0604020202020204" pitchFamily="34" charset="0"/>
+                  </a:rPr>
+                  <a:t>Deep</a:t>
+                </a:r>
+                <a:r>
+                  <a:rPr lang="fr-FR" sz="1100" b="1" dirty="0" smtClean="0">
+                    <a:latin typeface="Arial" panose="020B0604020202020204" pitchFamily="34" charset="0"/>
+                    <a:cs typeface="Arial" panose="020B0604020202020204" pitchFamily="34" charset="0"/>
+                  </a:rPr>
+                  <a:t> </a:t>
+                </a:r>
+                <a:r>
+                  <a:rPr lang="fr-FR" sz="1100" b="1" dirty="0" err="1" smtClean="0">
+                    <a:latin typeface="Arial" panose="020B0604020202020204" pitchFamily="34" charset="0"/>
+                    <a:cs typeface="Arial" panose="020B0604020202020204" pitchFamily="34" charset="0"/>
+                  </a:rPr>
+                  <a:t>slope</a:t>
+                </a:r>
+                <a:r>
+                  <a:rPr lang="fr-FR" sz="1100" b="1" dirty="0" smtClean="0">
+                    <a:latin typeface="Arial" panose="020B0604020202020204" pitchFamily="34" charset="0"/>
+                    <a:cs typeface="Arial" panose="020B0604020202020204" pitchFamily="34" charset="0"/>
+                  </a:rPr>
+                  <a:t> </a:t>
+                </a:r>
+                <a:endParaRPr lang="fr-FR" sz="1100" b="1" dirty="0">
+                  <a:latin typeface="Arial" panose="020B0604020202020204" pitchFamily="34" charset="0"/>
+                  <a:cs typeface="Arial" panose="020B0604020202020204" pitchFamily="34" charset="0"/>
+                </a:endParaRPr>
+              </a:p>
+            </p:txBody>
+          </p:sp>
+        </p:grpSp>
+        <p:grpSp>
+          <p:nvGrpSpPr>
+            <p:cNvPr id="8" name="Groupe 7"/>
+            <p:cNvGrpSpPr/>
+            <p:nvPr/>
+          </p:nvGrpSpPr>
+          <p:grpSpPr>
+            <a:xfrm>
+              <a:off x="5200649" y="6833628"/>
+              <a:ext cx="3581401" cy="478922"/>
+              <a:chOff x="5200649" y="6833628"/>
+              <a:chExt cx="3581401" cy="478922"/>
+            </a:xfrm>
+          </p:grpSpPr>
+          <p:sp>
+            <p:nvSpPr>
+              <p:cNvPr id="7" name="Triangle isocèle 6"/>
+              <p:cNvSpPr/>
+              <p:nvPr/>
+            </p:nvSpPr>
+            <p:spPr>
+              <a:xfrm>
+                <a:off x="5200649" y="6906501"/>
+                <a:ext cx="108000" cy="108000"/>
+              </a:xfrm>
+              <a:prstGeom prst="triangle">
+                <a:avLst/>
+              </a:prstGeom>
+              <a:noFill/>
+              <a:ln>
+                <a:solidFill>
+                  <a:schemeClr val="tx1"/>
+                </a:solidFill>
+              </a:ln>
+            </p:spPr>
+            <p:style>
+              <a:lnRef idx="2">
+                <a:schemeClr val="accent1">
+                  <a:shade val="50000"/>
+                </a:schemeClr>
+              </a:lnRef>
+              <a:fillRef idx="1">
+                <a:schemeClr val="accent1"/>
+              </a:fillRef>
+              <a:effectRef idx="0">
+                <a:schemeClr val="accent1"/>
+              </a:effectRef>
+              <a:fontRef idx="minor">
+                <a:schemeClr val="lt1"/>
+              </a:fontRef>
+            </p:style>
+            <p:txBody>
+              <a:bodyPr rtlCol="0" anchor="ctr"/>
+              <a:lstStyle/>
+              <a:p>
+                <a:pPr algn="ctr"/>
+                <a:endParaRPr lang="fr-FR"/>
+              </a:p>
+            </p:txBody>
+          </p:sp>
+          <p:sp>
+            <p:nvSpPr>
+              <p:cNvPr id="25" name="Ellipse 24"/>
+              <p:cNvSpPr/>
+              <p:nvPr/>
+            </p:nvSpPr>
+            <p:spPr>
+              <a:xfrm>
+                <a:off x="5200649" y="7127745"/>
+                <a:ext cx="108000" cy="108000"/>
+              </a:xfrm>
+              <a:prstGeom prst="ellipse">
+                <a:avLst/>
+              </a:prstGeom>
+              <a:noFill/>
+              <a:ln>
+                <a:solidFill>
+                  <a:schemeClr val="tx1"/>
+                </a:solidFill>
+              </a:ln>
+            </p:spPr>
+            <p:style>
+              <a:lnRef idx="2">
+                <a:schemeClr val="accent1">
+                  <a:shade val="50000"/>
+                </a:schemeClr>
+              </a:lnRef>
+              <a:fillRef idx="1">
+                <a:schemeClr val="accent1"/>
+              </a:fillRef>
+              <a:effectRef idx="0">
+                <a:schemeClr val="accent1"/>
+              </a:effectRef>
+              <a:fontRef idx="minor">
+                <a:schemeClr val="lt1"/>
+              </a:fontRef>
+            </p:style>
+            <p:txBody>
+              <a:bodyPr rtlCol="0" anchor="ctr"/>
+              <a:lstStyle/>
+              <a:p>
+                <a:pPr algn="ctr"/>
+                <a:endParaRPr lang="fr-FR"/>
+              </a:p>
+            </p:txBody>
+          </p:sp>
+          <p:sp>
+            <p:nvSpPr>
+              <p:cNvPr id="26" name="ZoneTexte 25"/>
+              <p:cNvSpPr txBox="1"/>
+              <p:nvPr/>
+            </p:nvSpPr>
+            <p:spPr>
+              <a:xfrm>
+                <a:off x="5308649" y="6833628"/>
+                <a:ext cx="1460476" cy="261610"/>
+              </a:xfrm>
+              <a:prstGeom prst="rect">
+                <a:avLst/>
+              </a:prstGeom>
+              <a:noFill/>
+            </p:spPr>
+            <p:txBody>
+              <a:bodyPr wrap="square" rtlCol="0">
+                <a:spAutoFit/>
+              </a:bodyPr>
+              <a:lstStyle/>
+              <a:p>
+                <a:r>
+                  <a:rPr lang="fr-FR" sz="1100" b="1" dirty="0" smtClean="0">
+                    <a:latin typeface="Arial" panose="020B0604020202020204" pitchFamily="34" charset="0"/>
+                    <a:cs typeface="Arial" panose="020B0604020202020204" pitchFamily="34" charset="0"/>
+                  </a:rPr>
+                  <a:t>BRUVS </a:t>
+                </a:r>
+                <a:r>
+                  <a:rPr lang="fr-FR" sz="1100" b="1" dirty="0" err="1" smtClean="0">
+                    <a:latin typeface="Arial" panose="020B0604020202020204" pitchFamily="34" charset="0"/>
+                    <a:cs typeface="Arial" panose="020B0604020202020204" pitchFamily="34" charset="0"/>
+                  </a:rPr>
+                  <a:t>samples</a:t>
+                </a:r>
+                <a:endParaRPr lang="fr-FR" sz="1100" b="1" dirty="0">
+                  <a:latin typeface="Arial" panose="020B0604020202020204" pitchFamily="34" charset="0"/>
+                  <a:cs typeface="Arial" panose="020B0604020202020204" pitchFamily="34" charset="0"/>
+                </a:endParaRPr>
+              </a:p>
+            </p:txBody>
+          </p:sp>
+          <p:sp>
+            <p:nvSpPr>
+              <p:cNvPr id="28" name="ZoneTexte 27"/>
+              <p:cNvSpPr txBox="1"/>
+              <p:nvPr/>
+            </p:nvSpPr>
+            <p:spPr>
+              <a:xfrm>
+                <a:off x="5308649" y="7050940"/>
+                <a:ext cx="1832723" cy="261610"/>
+              </a:xfrm>
+              <a:prstGeom prst="rect">
+                <a:avLst/>
+              </a:prstGeom>
+              <a:noFill/>
+            </p:spPr>
+            <p:txBody>
+              <a:bodyPr wrap="square" rtlCol="0">
+                <a:spAutoFit/>
+              </a:bodyPr>
+              <a:lstStyle/>
+              <a:p>
+                <a:r>
+                  <a:rPr lang="fr-FR" sz="1100" b="1" dirty="0" smtClean="0">
+                    <a:latin typeface="Arial" panose="020B0604020202020204" pitchFamily="34" charset="0"/>
+                    <a:cs typeface="Arial" panose="020B0604020202020204" pitchFamily="34" charset="0"/>
+                  </a:rPr>
+                  <a:t>eDNA </a:t>
+                </a:r>
+                <a:r>
+                  <a:rPr lang="fr-FR" sz="1100" b="1" dirty="0" err="1" smtClean="0">
+                    <a:latin typeface="Arial" panose="020B0604020202020204" pitchFamily="34" charset="0"/>
+                    <a:cs typeface="Arial" panose="020B0604020202020204" pitchFamily="34" charset="0"/>
+                  </a:rPr>
+                  <a:t>samples</a:t>
+                </a:r>
+                <a:endParaRPr lang="fr-FR" sz="1100" b="1" dirty="0">
+                  <a:latin typeface="Arial" panose="020B0604020202020204" pitchFamily="34" charset="0"/>
+                  <a:cs typeface="Arial" panose="020B0604020202020204" pitchFamily="34" charset="0"/>
+                </a:endParaRPr>
+              </a:p>
+            </p:txBody>
+          </p:sp>
+          <p:sp>
+            <p:nvSpPr>
+              <p:cNvPr id="29" name="Ellipse 28"/>
+              <p:cNvSpPr/>
+              <p:nvPr/>
+            </p:nvSpPr>
+            <p:spPr>
+              <a:xfrm>
+                <a:off x="6820601" y="6928433"/>
+                <a:ext cx="72000" cy="72000"/>
+              </a:xfrm>
+              <a:prstGeom prst="ellipse">
+                <a:avLst/>
+              </a:prstGeom>
+              <a:solidFill>
+                <a:schemeClr val="tx1"/>
+              </a:solidFill>
+              <a:ln>
+                <a:solidFill>
+                  <a:schemeClr val="tx1"/>
+                </a:solidFill>
+              </a:ln>
+            </p:spPr>
+            <p:style>
+              <a:lnRef idx="2">
+                <a:schemeClr val="accent1">
+                  <a:shade val="50000"/>
+                </a:schemeClr>
+              </a:lnRef>
+              <a:fillRef idx="1">
+                <a:schemeClr val="accent1"/>
+              </a:fillRef>
+              <a:effectRef idx="0">
+                <a:schemeClr val="accent1"/>
+              </a:effectRef>
+              <a:fontRef idx="minor">
+                <a:schemeClr val="lt1"/>
+              </a:fontRef>
+            </p:style>
+            <p:txBody>
+              <a:bodyPr rtlCol="0" anchor="ctr"/>
+              <a:lstStyle/>
+              <a:p>
+                <a:pPr algn="ctr"/>
+                <a:endParaRPr lang="fr-FR"/>
+              </a:p>
+            </p:txBody>
+          </p:sp>
+          <p:sp>
+            <p:nvSpPr>
+              <p:cNvPr id="30" name="ZoneTexte 29"/>
+              <p:cNvSpPr txBox="1"/>
+              <p:nvPr/>
+            </p:nvSpPr>
+            <p:spPr>
+              <a:xfrm>
+                <a:off x="6886580" y="6833628"/>
+                <a:ext cx="1895470" cy="261610"/>
+              </a:xfrm>
+              <a:prstGeom prst="rect">
+                <a:avLst/>
+              </a:prstGeom>
+              <a:noFill/>
+            </p:spPr>
+            <p:txBody>
+              <a:bodyPr wrap="square" rtlCol="0">
+                <a:spAutoFit/>
+              </a:bodyPr>
+              <a:lstStyle/>
+              <a:p>
+                <a:r>
+                  <a:rPr lang="fr-FR" sz="1100" b="1" dirty="0" err="1" smtClean="0">
+                    <a:latin typeface="Arial" panose="020B0604020202020204" pitchFamily="34" charset="0"/>
+                    <a:cs typeface="Arial" panose="020B0604020202020204" pitchFamily="34" charset="0"/>
+                  </a:rPr>
+                  <a:t>Acoustic</a:t>
+                </a:r>
+                <a:r>
+                  <a:rPr lang="fr-FR" sz="1100" b="1" dirty="0" smtClean="0">
+                    <a:latin typeface="Arial" panose="020B0604020202020204" pitchFamily="34" charset="0"/>
+                    <a:cs typeface="Arial" panose="020B0604020202020204" pitchFamily="34" charset="0"/>
+                  </a:rPr>
+                  <a:t> </a:t>
+                </a:r>
+                <a:r>
+                  <a:rPr lang="fr-FR" sz="1100" b="1" dirty="0" err="1" smtClean="0">
+                    <a:latin typeface="Arial" panose="020B0604020202020204" pitchFamily="34" charset="0"/>
+                    <a:cs typeface="Arial" panose="020B0604020202020204" pitchFamily="34" charset="0"/>
+                  </a:rPr>
+                  <a:t>recordings</a:t>
+                </a:r>
+                <a:endParaRPr lang="fr-FR" sz="1100" b="1" dirty="0">
+                  <a:latin typeface="Arial" panose="020B0604020202020204" pitchFamily="34" charset="0"/>
+                  <a:cs typeface="Arial" panose="020B0604020202020204" pitchFamily="34" charset="0"/>
+                </a:endParaRPr>
+              </a:p>
+            </p:txBody>
+          </p:sp>
+        </p:grpSp>
+      </p:grpSp>
     </p:spTree>
     <p:extLst>
       <p:ext uri="{BB962C8B-B14F-4D97-AF65-F5344CB8AC3E}">
         <p14:creationId xmlns:p14="http://schemas.microsoft.com/office/powerpoint/2010/main" val="3936704441"/>
+      </p:ext>
+    </p:extLst>
+  </p:cSld>
+  <p:clrMapOvr>
+    <a:masterClrMapping/>
+  </p:clrMapOvr>
+</p:sld>
+</file>
+
+<file path=ppt/slides/slide4.xml><?xml version="1.0" encoding="utf-8"?>
+<p:sld xmlns:a="http://schemas.openxmlformats.org/drawingml/2006/main" xmlns:r="http://schemas.openxmlformats.org/officeDocument/2006/relationships" xmlns:p="http://schemas.openxmlformats.org/presentationml/2006/main">
+  <p:cSld>
+    <p:spTree>
+      <p:nvGrpSpPr>
+        <p:cNvPr id="1" name=""/>
+        <p:cNvGrpSpPr/>
+        <p:nvPr/>
+      </p:nvGrpSpPr>
+      <p:grpSpPr>
+        <a:xfrm>
+          <a:off x="0" y="0"/>
+          <a:ext cx="0" cy="0"/>
+          <a:chOff x="0" y="0"/>
+          <a:chExt cx="0" cy="0"/>
+        </a:xfrm>
+      </p:grpSpPr>
+      <p:grpSp>
+        <p:nvGrpSpPr>
+          <p:cNvPr id="41" name="Groupe 40"/>
+          <p:cNvGrpSpPr/>
+          <p:nvPr/>
+        </p:nvGrpSpPr>
+        <p:grpSpPr>
+          <a:xfrm>
+            <a:off x="136490" y="-2393604"/>
+            <a:ext cx="10968959" cy="9214380"/>
+            <a:chOff x="136490" y="-2393604"/>
+            <a:chExt cx="10968959" cy="9214380"/>
+          </a:xfrm>
+        </p:grpSpPr>
+        <p:grpSp>
+          <p:nvGrpSpPr>
+            <p:cNvPr id="18" name="Groupe 17"/>
+            <p:cNvGrpSpPr/>
+            <p:nvPr/>
+          </p:nvGrpSpPr>
+          <p:grpSpPr>
+            <a:xfrm>
+              <a:off x="136490" y="-2393604"/>
+              <a:ext cx="8923428" cy="9214380"/>
+              <a:chOff x="117440" y="-2336454"/>
+              <a:chExt cx="8923428" cy="9214380"/>
+            </a:xfrm>
+          </p:grpSpPr>
+          <p:grpSp>
+            <p:nvGrpSpPr>
+              <p:cNvPr id="13" name="Groupe 12"/>
+              <p:cNvGrpSpPr/>
+              <p:nvPr/>
+            </p:nvGrpSpPr>
+            <p:grpSpPr>
+              <a:xfrm>
+                <a:off x="117440" y="-2336454"/>
+                <a:ext cx="8923428" cy="9214380"/>
+                <a:chOff x="117440" y="-2336454"/>
+                <a:chExt cx="8923428" cy="9214380"/>
+              </a:xfrm>
+            </p:grpSpPr>
+            <p:pic>
+              <p:nvPicPr>
+                <p:cNvPr id="2" name="Image 1"/>
+                <p:cNvPicPr>
+                  <a:picLocks noChangeAspect="1"/>
+                </p:cNvPicPr>
+                <p:nvPr/>
+              </p:nvPicPr>
+              <p:blipFill rotWithShape="1">
+                <a:blip r:embed="rId2" cstate="print">
+                  <a:extLst>
+                    <a:ext uri="{28A0092B-C50C-407E-A947-70E740481C1C}">
+                      <a14:useLocalDpi xmlns:a14="http://schemas.microsoft.com/office/drawing/2010/main" val="0"/>
+                    </a:ext>
+                  </a:extLst>
+                </a:blip>
+                <a:srcRect t="11450" b="23470"/>
+                <a:stretch/>
+              </p:blipFill>
+              <p:spPr>
+                <a:xfrm>
+                  <a:off x="453123" y="-2336454"/>
+                  <a:ext cx="8445345" cy="5496167"/>
+                </a:xfrm>
+                <a:prstGeom prst="rect">
+                  <a:avLst/>
+                </a:prstGeom>
+              </p:spPr>
+            </p:pic>
+            <p:pic>
+              <p:nvPicPr>
+                <p:cNvPr id="3" name="Image 2"/>
+                <p:cNvPicPr>
+                  <a:picLocks noChangeAspect="1"/>
+                </p:cNvPicPr>
+                <p:nvPr/>
+              </p:nvPicPr>
+              <p:blipFill>
+                <a:blip r:embed="rId3" cstate="print">
+                  <a:extLst>
+                    <a:ext uri="{28A0092B-C50C-407E-A947-70E740481C1C}">
+                      <a14:useLocalDpi xmlns:a14="http://schemas.microsoft.com/office/drawing/2010/main" val="0"/>
+                    </a:ext>
+                  </a:extLst>
+                </a:blip>
+                <a:stretch>
+                  <a:fillRect/>
+                </a:stretch>
+              </p:blipFill>
+              <p:spPr>
+                <a:xfrm>
+                  <a:off x="117440" y="3109155"/>
+                  <a:ext cx="4704915" cy="3528687"/>
+                </a:xfrm>
+                <a:prstGeom prst="rect">
+                  <a:avLst/>
+                </a:prstGeom>
+              </p:spPr>
+            </p:pic>
+            <p:pic>
+              <p:nvPicPr>
+                <p:cNvPr id="10" name="Image 9"/>
+                <p:cNvPicPr>
+                  <a:picLocks noChangeAspect="1"/>
+                </p:cNvPicPr>
+                <p:nvPr/>
+              </p:nvPicPr>
+              <p:blipFill>
+                <a:blip r:embed="rId4" cstate="print">
+                  <a:extLst>
+                    <a:ext uri="{28A0092B-C50C-407E-A947-70E740481C1C}">
+                      <a14:useLocalDpi xmlns:a14="http://schemas.microsoft.com/office/drawing/2010/main" val="0"/>
+                    </a:ext>
+                  </a:extLst>
+                </a:blip>
+                <a:stretch>
+                  <a:fillRect/>
+                </a:stretch>
+              </p:blipFill>
+              <p:spPr>
+                <a:xfrm>
+                  <a:off x="4336869" y="3109155"/>
+                  <a:ext cx="4703999" cy="3528000"/>
+                </a:xfrm>
+                <a:prstGeom prst="rect">
+                  <a:avLst/>
+                </a:prstGeom>
+              </p:spPr>
+            </p:pic>
+            <p:pic>
+              <p:nvPicPr>
+                <p:cNvPr id="11" name="Image 10"/>
+                <p:cNvPicPr>
+                  <a:picLocks noChangeAspect="1"/>
+                </p:cNvPicPr>
+                <p:nvPr/>
+              </p:nvPicPr>
+              <p:blipFill rotWithShape="1">
+                <a:blip r:embed="rId5" cstate="print">
+                  <a:extLst>
+                    <a:ext uri="{28A0092B-C50C-407E-A947-70E740481C1C}">
+                      <a14:useLocalDpi xmlns:a14="http://schemas.microsoft.com/office/drawing/2010/main" val="0"/>
+                    </a:ext>
+                  </a:extLst>
+                </a:blip>
+                <a:srcRect l="7292" t="1281" r="7292" b="2245"/>
+                <a:stretch/>
+              </p:blipFill>
+              <p:spPr>
+                <a:xfrm>
+                  <a:off x="6057900" y="-1846765"/>
+                  <a:ext cx="2724150" cy="1501605"/>
+                </a:xfrm>
+                <a:prstGeom prst="rect">
+                  <a:avLst/>
+                </a:prstGeom>
+                <a:ln>
+                  <a:solidFill>
+                    <a:schemeClr val="tx1"/>
+                  </a:solidFill>
+                </a:ln>
+              </p:spPr>
+            </p:pic>
+            <p:pic>
+              <p:nvPicPr>
+                <p:cNvPr id="12" name="Image 11"/>
+                <p:cNvPicPr>
+                  <a:picLocks noChangeAspect="1"/>
+                </p:cNvPicPr>
+                <p:nvPr/>
+              </p:nvPicPr>
+              <p:blipFill rotWithShape="1">
+                <a:blip r:embed="rId2" cstate="print">
+                  <a:extLst>
+                    <a:ext uri="{28A0092B-C50C-407E-A947-70E740481C1C}">
+                      <a14:useLocalDpi xmlns:a14="http://schemas.microsoft.com/office/drawing/2010/main" val="0"/>
+                    </a:ext>
+                  </a:extLst>
+                </a:blip>
+                <a:srcRect l="20571" t="79866" r="12413" b="12781"/>
+                <a:stretch/>
+              </p:blipFill>
+              <p:spPr>
+                <a:xfrm>
+                  <a:off x="2530989" y="6407279"/>
+                  <a:ext cx="4289612" cy="470647"/>
+                </a:xfrm>
+                <a:prstGeom prst="rect">
+                  <a:avLst/>
+                </a:prstGeom>
+              </p:spPr>
+            </p:pic>
+          </p:grpSp>
+          <p:sp>
+            <p:nvSpPr>
+              <p:cNvPr id="14" name="ZoneTexte 13"/>
+              <p:cNvSpPr txBox="1"/>
+              <p:nvPr/>
+            </p:nvSpPr>
+            <p:spPr>
+              <a:xfrm>
+                <a:off x="1250575" y="-941294"/>
+                <a:ext cx="1532965" cy="307777"/>
+              </a:xfrm>
+              <a:prstGeom prst="rect">
+                <a:avLst/>
+              </a:prstGeom>
+              <a:noFill/>
+            </p:spPr>
+            <p:txBody>
+              <a:bodyPr wrap="square" rtlCol="0">
+                <a:spAutoFit/>
+              </a:bodyPr>
+              <a:lstStyle/>
+              <a:p>
+                <a:r>
+                  <a:rPr lang="fr-FR" sz="1400" i="1" dirty="0" smtClean="0">
+                    <a:latin typeface="Arial" panose="020B0604020202020204" pitchFamily="34" charset="0"/>
+                    <a:cs typeface="Arial" panose="020B0604020202020204" pitchFamily="34" charset="0"/>
+                  </a:rPr>
+                  <a:t>Chesterfield</a:t>
+                </a:r>
+                <a:endParaRPr lang="fr-FR" sz="1400" i="1" dirty="0">
+                  <a:latin typeface="Arial" panose="020B0604020202020204" pitchFamily="34" charset="0"/>
+                  <a:cs typeface="Arial" panose="020B0604020202020204" pitchFamily="34" charset="0"/>
+                </a:endParaRPr>
+              </a:p>
+            </p:txBody>
+          </p:sp>
+          <p:sp>
+            <p:nvSpPr>
+              <p:cNvPr id="15" name="ZoneTexte 14"/>
+              <p:cNvSpPr txBox="1"/>
+              <p:nvPr/>
+            </p:nvSpPr>
+            <p:spPr>
+              <a:xfrm>
+                <a:off x="1510552" y="0"/>
+                <a:ext cx="856131" cy="307777"/>
+              </a:xfrm>
+              <a:prstGeom prst="rect">
+                <a:avLst/>
+              </a:prstGeom>
+              <a:noFill/>
+            </p:spPr>
+            <p:txBody>
+              <a:bodyPr wrap="square" rtlCol="0">
+                <a:spAutoFit/>
+              </a:bodyPr>
+              <a:lstStyle/>
+              <a:p>
+                <a:r>
+                  <a:rPr lang="fr-FR" sz="1400" i="1" dirty="0" smtClean="0">
+                    <a:latin typeface="Arial" panose="020B0604020202020204" pitchFamily="34" charset="0"/>
+                    <a:cs typeface="Arial" panose="020B0604020202020204" pitchFamily="34" charset="0"/>
+                  </a:rPr>
+                  <a:t>Bellona</a:t>
+                </a:r>
+                <a:endParaRPr lang="fr-FR" sz="1400" i="1" dirty="0">
+                  <a:latin typeface="Arial" panose="020B0604020202020204" pitchFamily="34" charset="0"/>
+                  <a:cs typeface="Arial" panose="020B0604020202020204" pitchFamily="34" charset="0"/>
+                </a:endParaRPr>
+              </a:p>
+            </p:txBody>
+          </p:sp>
+          <p:sp>
+            <p:nvSpPr>
+              <p:cNvPr id="16" name="ZoneTexte 15"/>
+              <p:cNvSpPr txBox="1"/>
+              <p:nvPr/>
+            </p:nvSpPr>
+            <p:spPr>
+              <a:xfrm>
+                <a:off x="3487269" y="-1595718"/>
+                <a:ext cx="1532965" cy="307777"/>
+              </a:xfrm>
+              <a:prstGeom prst="rect">
+                <a:avLst/>
+              </a:prstGeom>
+              <a:noFill/>
+            </p:spPr>
+            <p:txBody>
+              <a:bodyPr wrap="square" rtlCol="0">
+                <a:spAutoFit/>
+              </a:bodyPr>
+              <a:lstStyle/>
+              <a:p>
+                <a:r>
+                  <a:rPr lang="fr-FR" sz="1400" i="1" dirty="0" smtClean="0">
+                    <a:latin typeface="Arial" panose="020B0604020202020204" pitchFamily="34" charset="0"/>
+                    <a:cs typeface="Arial" panose="020B0604020202020204" pitchFamily="34" charset="0"/>
+                  </a:rPr>
+                  <a:t>D’Entrecasteaux</a:t>
+                </a:r>
+                <a:endParaRPr lang="fr-FR" sz="1400" i="1" dirty="0">
+                  <a:latin typeface="Arial" panose="020B0604020202020204" pitchFamily="34" charset="0"/>
+                  <a:cs typeface="Arial" panose="020B0604020202020204" pitchFamily="34" charset="0"/>
+                </a:endParaRPr>
+              </a:p>
+            </p:txBody>
+          </p:sp>
+          <p:sp>
+            <p:nvSpPr>
+              <p:cNvPr id="17" name="ZoneTexte 16"/>
+              <p:cNvSpPr txBox="1"/>
+              <p:nvPr/>
+            </p:nvSpPr>
+            <p:spPr>
+              <a:xfrm>
+                <a:off x="4678937" y="632013"/>
+                <a:ext cx="874700" cy="317320"/>
+              </a:xfrm>
+              <a:prstGeom prst="rect">
+                <a:avLst/>
+              </a:prstGeom>
+              <a:noFill/>
+            </p:spPr>
+            <p:txBody>
+              <a:bodyPr wrap="square" rtlCol="0">
+                <a:spAutoFit/>
+              </a:bodyPr>
+              <a:lstStyle/>
+              <a:p>
+                <a:r>
+                  <a:rPr lang="fr-FR" sz="1400" i="1" dirty="0" smtClean="0">
+                    <a:latin typeface="Arial" panose="020B0604020202020204" pitchFamily="34" charset="0"/>
+                    <a:cs typeface="Arial" panose="020B0604020202020204" pitchFamily="34" charset="0"/>
+                  </a:rPr>
+                  <a:t>Nouméa</a:t>
+                </a:r>
+                <a:endParaRPr lang="fr-FR" sz="1400" i="1" dirty="0">
+                  <a:latin typeface="Arial" panose="020B0604020202020204" pitchFamily="34" charset="0"/>
+                  <a:cs typeface="Arial" panose="020B0604020202020204" pitchFamily="34" charset="0"/>
+                </a:endParaRPr>
+              </a:p>
+            </p:txBody>
+          </p:sp>
+        </p:grpSp>
+        <p:grpSp>
+          <p:nvGrpSpPr>
+            <p:cNvPr id="40" name="Groupe 39"/>
+            <p:cNvGrpSpPr/>
+            <p:nvPr/>
+          </p:nvGrpSpPr>
+          <p:grpSpPr>
+            <a:xfrm>
+              <a:off x="9059918" y="-711037"/>
+              <a:ext cx="1982784" cy="1596586"/>
+              <a:chOff x="9059918" y="-711037"/>
+              <a:chExt cx="1982784" cy="1596586"/>
+            </a:xfrm>
+          </p:grpSpPr>
+          <p:grpSp>
+            <p:nvGrpSpPr>
+              <p:cNvPr id="34" name="Groupe 33"/>
+              <p:cNvGrpSpPr/>
+              <p:nvPr/>
+            </p:nvGrpSpPr>
+            <p:grpSpPr>
+              <a:xfrm>
+                <a:off x="9144000" y="-59007"/>
+                <a:ext cx="1467610" cy="261610"/>
+                <a:chOff x="1334981" y="7153693"/>
+                <a:chExt cx="1467610" cy="261610"/>
+              </a:xfrm>
+            </p:grpSpPr>
+            <p:sp>
+              <p:nvSpPr>
+                <p:cNvPr id="19" name="Ellipse 18"/>
+                <p:cNvSpPr/>
+                <p:nvPr/>
+              </p:nvSpPr>
+              <p:spPr>
+                <a:xfrm>
+                  <a:off x="1334981" y="7228668"/>
+                  <a:ext cx="108000" cy="108000"/>
+                </a:xfrm>
+                <a:prstGeom prst="ellipse">
+                  <a:avLst/>
+                </a:prstGeom>
+                <a:solidFill>
+                  <a:srgbClr val="20A387"/>
+                </a:solidFill>
+                <a:ln>
+                  <a:solidFill>
+                    <a:schemeClr val="tx1"/>
+                  </a:solidFill>
+                </a:ln>
+              </p:spPr>
+              <p:style>
+                <a:lnRef idx="2">
+                  <a:schemeClr val="accent1">
+                    <a:shade val="50000"/>
+                  </a:schemeClr>
+                </a:lnRef>
+                <a:fillRef idx="1">
+                  <a:schemeClr val="accent1"/>
+                </a:fillRef>
+                <a:effectRef idx="0">
+                  <a:schemeClr val="accent1"/>
+                </a:effectRef>
+                <a:fontRef idx="minor">
+                  <a:schemeClr val="lt1"/>
+                </a:fontRef>
+              </p:style>
+              <p:txBody>
+                <a:bodyPr rtlCol="0" anchor="ctr"/>
+                <a:lstStyle/>
+                <a:p>
+                  <a:pPr algn="ctr"/>
+                  <a:endParaRPr lang="fr-FR"/>
+                </a:p>
+              </p:txBody>
+            </p:sp>
+            <p:sp>
+              <p:nvSpPr>
+                <p:cNvPr id="5" name="ZoneTexte 4"/>
+                <p:cNvSpPr txBox="1"/>
+                <p:nvPr/>
+              </p:nvSpPr>
+              <p:spPr>
+                <a:xfrm>
+                  <a:off x="1395357" y="7153693"/>
+                  <a:ext cx="1407234" cy="261610"/>
+                </a:xfrm>
+                <a:prstGeom prst="rect">
+                  <a:avLst/>
+                </a:prstGeom>
+                <a:noFill/>
+              </p:spPr>
+              <p:txBody>
+                <a:bodyPr wrap="square" rtlCol="0">
+                  <a:spAutoFit/>
+                </a:bodyPr>
+                <a:lstStyle/>
+                <a:p>
+                  <a:r>
+                    <a:rPr lang="fr-FR" sz="1100" b="1" dirty="0" err="1" smtClean="0">
+                      <a:latin typeface="Arial" panose="020B0604020202020204" pitchFamily="34" charset="0"/>
+                      <a:cs typeface="Arial" panose="020B0604020202020204" pitchFamily="34" charset="0"/>
+                    </a:rPr>
+                    <a:t>Seamount</a:t>
+                  </a:r>
+                  <a:r>
+                    <a:rPr lang="fr-FR" sz="1100" b="1" dirty="0" smtClean="0">
+                      <a:latin typeface="Arial" panose="020B0604020202020204" pitchFamily="34" charset="0"/>
+                      <a:cs typeface="Arial" panose="020B0604020202020204" pitchFamily="34" charset="0"/>
+                    </a:rPr>
+                    <a:t> ~50m</a:t>
+                  </a:r>
+                  <a:endParaRPr lang="fr-FR" sz="1100" b="1" dirty="0">
+                    <a:latin typeface="Arial" panose="020B0604020202020204" pitchFamily="34" charset="0"/>
+                    <a:cs typeface="Arial" panose="020B0604020202020204" pitchFamily="34" charset="0"/>
+                  </a:endParaRPr>
+                </a:p>
+              </p:txBody>
+            </p:sp>
+          </p:grpSp>
+          <p:grpSp>
+            <p:nvGrpSpPr>
+              <p:cNvPr id="35" name="Groupe 34"/>
+              <p:cNvGrpSpPr/>
+              <p:nvPr/>
+            </p:nvGrpSpPr>
+            <p:grpSpPr>
+              <a:xfrm>
+                <a:off x="9144000" y="280636"/>
+                <a:ext cx="1898702" cy="261610"/>
+                <a:chOff x="2944466" y="6929563"/>
+                <a:chExt cx="1898702" cy="261610"/>
+              </a:xfrm>
+            </p:grpSpPr>
+            <p:sp>
+              <p:nvSpPr>
+                <p:cNvPr id="20" name="Ellipse 19"/>
+                <p:cNvSpPr/>
+                <p:nvPr/>
+              </p:nvSpPr>
+              <p:spPr>
+                <a:xfrm>
+                  <a:off x="2944466" y="7006368"/>
+                  <a:ext cx="108000" cy="108000"/>
+                </a:xfrm>
+                <a:prstGeom prst="ellipse">
+                  <a:avLst/>
+                </a:prstGeom>
+                <a:solidFill>
+                  <a:srgbClr val="B40F20"/>
+                </a:solidFill>
+                <a:ln>
+                  <a:solidFill>
+                    <a:schemeClr val="tx1"/>
+                  </a:solidFill>
+                </a:ln>
+              </p:spPr>
+              <p:style>
+                <a:lnRef idx="2">
+                  <a:schemeClr val="accent1">
+                    <a:shade val="50000"/>
+                  </a:schemeClr>
+                </a:lnRef>
+                <a:fillRef idx="1">
+                  <a:schemeClr val="accent1"/>
+                </a:fillRef>
+                <a:effectRef idx="0">
+                  <a:schemeClr val="accent1"/>
+                </a:effectRef>
+                <a:fontRef idx="minor">
+                  <a:schemeClr val="lt1"/>
+                </a:fontRef>
+              </p:style>
+              <p:txBody>
+                <a:bodyPr rtlCol="0" anchor="ctr"/>
+                <a:lstStyle/>
+                <a:p>
+                  <a:pPr algn="ctr"/>
+                  <a:endParaRPr lang="fr-FR"/>
+                </a:p>
+              </p:txBody>
+            </p:sp>
+            <p:sp>
+              <p:nvSpPr>
+                <p:cNvPr id="22" name="ZoneTexte 21"/>
+                <p:cNvSpPr txBox="1"/>
+                <p:nvPr/>
+              </p:nvSpPr>
+              <p:spPr>
+                <a:xfrm>
+                  <a:off x="3010445" y="6929563"/>
+                  <a:ext cx="1832723" cy="261610"/>
+                </a:xfrm>
+                <a:prstGeom prst="rect">
+                  <a:avLst/>
+                </a:prstGeom>
+                <a:noFill/>
+              </p:spPr>
+              <p:txBody>
+                <a:bodyPr wrap="square" rtlCol="0">
+                  <a:spAutoFit/>
+                </a:bodyPr>
+                <a:lstStyle/>
+                <a:p>
+                  <a:r>
+                    <a:rPr lang="fr-FR" sz="1100" b="1" dirty="0" err="1" smtClean="0">
+                      <a:latin typeface="Arial" panose="020B0604020202020204" pitchFamily="34" charset="0"/>
+                      <a:cs typeface="Arial" panose="020B0604020202020204" pitchFamily="34" charset="0"/>
+                    </a:rPr>
+                    <a:t>Seamount</a:t>
+                  </a:r>
+                  <a:r>
+                    <a:rPr lang="fr-FR" sz="1100" b="1" dirty="0" smtClean="0">
+                      <a:latin typeface="Arial" panose="020B0604020202020204" pitchFamily="34" charset="0"/>
+                      <a:cs typeface="Arial" panose="020B0604020202020204" pitchFamily="34" charset="0"/>
+                    </a:rPr>
+                    <a:t> ~250m</a:t>
+                  </a:r>
+                  <a:endParaRPr lang="fr-FR" sz="1100" b="1" dirty="0">
+                    <a:latin typeface="Arial" panose="020B0604020202020204" pitchFamily="34" charset="0"/>
+                    <a:cs typeface="Arial" panose="020B0604020202020204" pitchFamily="34" charset="0"/>
+                  </a:endParaRPr>
+                </a:p>
+              </p:txBody>
+            </p:sp>
+          </p:grpSp>
+          <p:grpSp>
+            <p:nvGrpSpPr>
+              <p:cNvPr id="36" name="Groupe 35"/>
+              <p:cNvGrpSpPr/>
+              <p:nvPr/>
+            </p:nvGrpSpPr>
+            <p:grpSpPr>
+              <a:xfrm>
+                <a:off x="9144000" y="623939"/>
+                <a:ext cx="1898702" cy="261610"/>
+                <a:chOff x="2944466" y="7150807"/>
+                <a:chExt cx="1898702" cy="261610"/>
+              </a:xfrm>
+            </p:grpSpPr>
+            <p:sp>
+              <p:nvSpPr>
+                <p:cNvPr id="21" name="Ellipse 20"/>
+                <p:cNvSpPr/>
+                <p:nvPr/>
+              </p:nvSpPr>
+              <p:spPr>
+                <a:xfrm>
+                  <a:off x="2944466" y="7228668"/>
+                  <a:ext cx="108000" cy="108000"/>
+                </a:xfrm>
+                <a:prstGeom prst="ellipse">
+                  <a:avLst/>
+                </a:prstGeom>
+                <a:solidFill>
+                  <a:srgbClr val="440154"/>
+                </a:solidFill>
+                <a:ln>
+                  <a:solidFill>
+                    <a:schemeClr val="tx1"/>
+                  </a:solidFill>
+                </a:ln>
+              </p:spPr>
+              <p:style>
+                <a:lnRef idx="2">
+                  <a:schemeClr val="accent1">
+                    <a:shade val="50000"/>
+                  </a:schemeClr>
+                </a:lnRef>
+                <a:fillRef idx="1">
+                  <a:schemeClr val="accent1"/>
+                </a:fillRef>
+                <a:effectRef idx="0">
+                  <a:schemeClr val="accent1"/>
+                </a:effectRef>
+                <a:fontRef idx="minor">
+                  <a:schemeClr val="lt1"/>
+                </a:fontRef>
+              </p:style>
+              <p:txBody>
+                <a:bodyPr rtlCol="0" anchor="ctr"/>
+                <a:lstStyle/>
+                <a:p>
+                  <a:pPr algn="ctr"/>
+                  <a:endParaRPr lang="fr-FR"/>
+                </a:p>
+              </p:txBody>
+            </p:sp>
+            <p:sp>
+              <p:nvSpPr>
+                <p:cNvPr id="23" name="ZoneTexte 22"/>
+                <p:cNvSpPr txBox="1"/>
+                <p:nvPr/>
+              </p:nvSpPr>
+              <p:spPr>
+                <a:xfrm>
+                  <a:off x="3010445" y="7150807"/>
+                  <a:ext cx="1832723" cy="261610"/>
+                </a:xfrm>
+                <a:prstGeom prst="rect">
+                  <a:avLst/>
+                </a:prstGeom>
+                <a:noFill/>
+              </p:spPr>
+              <p:txBody>
+                <a:bodyPr wrap="square" rtlCol="0">
+                  <a:spAutoFit/>
+                </a:bodyPr>
+                <a:lstStyle/>
+                <a:p>
+                  <a:r>
+                    <a:rPr lang="fr-FR" sz="1100" b="1" dirty="0" err="1" smtClean="0">
+                      <a:latin typeface="Arial" panose="020B0604020202020204" pitchFamily="34" charset="0"/>
+                      <a:cs typeface="Arial" panose="020B0604020202020204" pitchFamily="34" charset="0"/>
+                    </a:rPr>
+                    <a:t>Seamount</a:t>
+                  </a:r>
+                  <a:r>
+                    <a:rPr lang="fr-FR" sz="1100" b="1" dirty="0" smtClean="0">
+                      <a:latin typeface="Arial" panose="020B0604020202020204" pitchFamily="34" charset="0"/>
+                      <a:cs typeface="Arial" panose="020B0604020202020204" pitchFamily="34" charset="0"/>
+                    </a:rPr>
+                    <a:t> ~500m</a:t>
+                  </a:r>
+                  <a:endParaRPr lang="fr-FR" sz="1100" b="1" dirty="0">
+                    <a:latin typeface="Arial" panose="020B0604020202020204" pitchFamily="34" charset="0"/>
+                    <a:cs typeface="Arial" panose="020B0604020202020204" pitchFamily="34" charset="0"/>
+                  </a:endParaRPr>
+                </a:p>
+              </p:txBody>
+            </p:sp>
+          </p:grpSp>
+          <p:grpSp>
+            <p:nvGrpSpPr>
+              <p:cNvPr id="33" name="Groupe 32"/>
+              <p:cNvGrpSpPr/>
+              <p:nvPr/>
+            </p:nvGrpSpPr>
+            <p:grpSpPr>
+              <a:xfrm>
+                <a:off x="9144000" y="-402310"/>
+                <a:ext cx="1467610" cy="261610"/>
+                <a:chOff x="1334981" y="6924675"/>
+                <a:chExt cx="1467610" cy="261610"/>
+              </a:xfrm>
+            </p:grpSpPr>
+            <p:sp>
+              <p:nvSpPr>
+                <p:cNvPr id="4" name="Ellipse 3"/>
+                <p:cNvSpPr/>
+                <p:nvPr/>
+              </p:nvSpPr>
+              <p:spPr>
+                <a:xfrm>
+                  <a:off x="1334981" y="7006368"/>
+                  <a:ext cx="108000" cy="108000"/>
+                </a:xfrm>
+                <a:prstGeom prst="ellipse">
+                  <a:avLst/>
+                </a:prstGeom>
+                <a:solidFill>
+                  <a:srgbClr val="FDE725"/>
+                </a:solidFill>
+                <a:ln>
+                  <a:solidFill>
+                    <a:schemeClr val="tx1"/>
+                  </a:solidFill>
+                </a:ln>
+              </p:spPr>
+              <p:style>
+                <a:lnRef idx="2">
+                  <a:schemeClr val="accent1">
+                    <a:shade val="50000"/>
+                  </a:schemeClr>
+                </a:lnRef>
+                <a:fillRef idx="1">
+                  <a:schemeClr val="accent1"/>
+                </a:fillRef>
+                <a:effectRef idx="0">
+                  <a:schemeClr val="accent1"/>
+                </a:effectRef>
+                <a:fontRef idx="minor">
+                  <a:schemeClr val="lt1"/>
+                </a:fontRef>
+              </p:style>
+              <p:txBody>
+                <a:bodyPr rtlCol="0" anchor="ctr"/>
+                <a:lstStyle/>
+                <a:p>
+                  <a:pPr algn="ctr"/>
+                  <a:endParaRPr lang="fr-FR"/>
+                </a:p>
+              </p:txBody>
+            </p:sp>
+            <p:sp>
+              <p:nvSpPr>
+                <p:cNvPr id="24" name="ZoneTexte 23"/>
+                <p:cNvSpPr txBox="1"/>
+                <p:nvPr/>
+              </p:nvSpPr>
+              <p:spPr>
+                <a:xfrm>
+                  <a:off x="1395357" y="6924675"/>
+                  <a:ext cx="1407234" cy="261610"/>
+                </a:xfrm>
+                <a:prstGeom prst="rect">
+                  <a:avLst/>
+                </a:prstGeom>
+                <a:noFill/>
+              </p:spPr>
+              <p:txBody>
+                <a:bodyPr wrap="square" rtlCol="0">
+                  <a:spAutoFit/>
+                </a:bodyPr>
+                <a:lstStyle/>
+                <a:p>
+                  <a:r>
+                    <a:rPr lang="fr-FR" sz="1100" b="1" dirty="0" err="1" smtClean="0">
+                      <a:latin typeface="Arial" panose="020B0604020202020204" pitchFamily="34" charset="0"/>
+                      <a:cs typeface="Arial" panose="020B0604020202020204" pitchFamily="34" charset="0"/>
+                    </a:rPr>
+                    <a:t>Deep</a:t>
+                  </a:r>
+                  <a:r>
+                    <a:rPr lang="fr-FR" sz="1100" b="1" dirty="0" smtClean="0">
+                      <a:latin typeface="Arial" panose="020B0604020202020204" pitchFamily="34" charset="0"/>
+                      <a:cs typeface="Arial" panose="020B0604020202020204" pitchFamily="34" charset="0"/>
+                    </a:rPr>
+                    <a:t> </a:t>
+                  </a:r>
+                  <a:r>
+                    <a:rPr lang="fr-FR" sz="1100" b="1" dirty="0" err="1" smtClean="0">
+                      <a:latin typeface="Arial" panose="020B0604020202020204" pitchFamily="34" charset="0"/>
+                      <a:cs typeface="Arial" panose="020B0604020202020204" pitchFamily="34" charset="0"/>
+                    </a:rPr>
+                    <a:t>slope</a:t>
+                  </a:r>
+                  <a:r>
+                    <a:rPr lang="fr-FR" sz="1100" b="1" dirty="0" smtClean="0">
+                      <a:latin typeface="Arial" panose="020B0604020202020204" pitchFamily="34" charset="0"/>
+                      <a:cs typeface="Arial" panose="020B0604020202020204" pitchFamily="34" charset="0"/>
+                    </a:rPr>
+                    <a:t> </a:t>
+                  </a:r>
+                  <a:endParaRPr lang="fr-FR" sz="1100" b="1" dirty="0">
+                    <a:latin typeface="Arial" panose="020B0604020202020204" pitchFamily="34" charset="0"/>
+                    <a:cs typeface="Arial" panose="020B0604020202020204" pitchFamily="34" charset="0"/>
+                  </a:endParaRPr>
+                </a:p>
+              </p:txBody>
+            </p:sp>
+          </p:grpSp>
+          <p:sp>
+            <p:nvSpPr>
+              <p:cNvPr id="37" name="ZoneTexte 36"/>
+              <p:cNvSpPr txBox="1"/>
+              <p:nvPr/>
+            </p:nvSpPr>
+            <p:spPr>
+              <a:xfrm>
+                <a:off x="9059918" y="-711037"/>
+                <a:ext cx="834975" cy="307777"/>
+              </a:xfrm>
+              <a:prstGeom prst="rect">
+                <a:avLst/>
+              </a:prstGeom>
+              <a:noFill/>
+            </p:spPr>
+            <p:txBody>
+              <a:bodyPr wrap="square" rtlCol="0">
+                <a:spAutoFit/>
+              </a:bodyPr>
+              <a:lstStyle/>
+              <a:p>
+                <a:r>
+                  <a:rPr lang="fr-FR" sz="1400" b="1" u="sng" dirty="0" smtClean="0">
+                    <a:latin typeface="Arial" panose="020B0604020202020204" pitchFamily="34" charset="0"/>
+                    <a:cs typeface="Arial" panose="020B0604020202020204" pitchFamily="34" charset="0"/>
+                  </a:rPr>
+                  <a:t>Habitat</a:t>
+                </a:r>
+                <a:endParaRPr lang="fr-FR" sz="1400" b="1" u="sng" dirty="0">
+                  <a:latin typeface="Arial" panose="020B0604020202020204" pitchFamily="34" charset="0"/>
+                  <a:cs typeface="Arial" panose="020B0604020202020204" pitchFamily="34" charset="0"/>
+                </a:endParaRPr>
+              </a:p>
+            </p:txBody>
+          </p:sp>
+        </p:grpSp>
+        <p:grpSp>
+          <p:nvGrpSpPr>
+            <p:cNvPr id="39" name="Groupe 38"/>
+            <p:cNvGrpSpPr/>
+            <p:nvPr/>
+          </p:nvGrpSpPr>
+          <p:grpSpPr>
+            <a:xfrm>
+              <a:off x="9059917" y="3614074"/>
+              <a:ext cx="2045532" cy="1288809"/>
+              <a:chOff x="9059917" y="3614074"/>
+              <a:chExt cx="2045532" cy="1288809"/>
+            </a:xfrm>
+          </p:grpSpPr>
+          <p:grpSp>
+            <p:nvGrpSpPr>
+              <p:cNvPr id="27" name="Groupe 26"/>
+              <p:cNvGrpSpPr/>
+              <p:nvPr/>
+            </p:nvGrpSpPr>
+            <p:grpSpPr>
+              <a:xfrm>
+                <a:off x="9144000" y="3972307"/>
+                <a:ext cx="1568476" cy="261610"/>
+                <a:chOff x="5354291" y="6933495"/>
+                <a:chExt cx="1568476" cy="261610"/>
+              </a:xfrm>
+            </p:grpSpPr>
+            <p:sp>
+              <p:nvSpPr>
+                <p:cNvPr id="7" name="Triangle isocèle 6"/>
+                <p:cNvSpPr/>
+                <p:nvPr/>
+              </p:nvSpPr>
+              <p:spPr>
+                <a:xfrm>
+                  <a:off x="5354291" y="7006368"/>
+                  <a:ext cx="108000" cy="108000"/>
+                </a:xfrm>
+                <a:prstGeom prst="triangle">
+                  <a:avLst/>
+                </a:prstGeom>
+                <a:noFill/>
+                <a:ln>
+                  <a:solidFill>
+                    <a:schemeClr val="tx1"/>
+                  </a:solidFill>
+                </a:ln>
+              </p:spPr>
+              <p:style>
+                <a:lnRef idx="2">
+                  <a:schemeClr val="accent1">
+                    <a:shade val="50000"/>
+                  </a:schemeClr>
+                </a:lnRef>
+                <a:fillRef idx="1">
+                  <a:schemeClr val="accent1"/>
+                </a:fillRef>
+                <a:effectRef idx="0">
+                  <a:schemeClr val="accent1"/>
+                </a:effectRef>
+                <a:fontRef idx="minor">
+                  <a:schemeClr val="lt1"/>
+                </a:fontRef>
+              </p:style>
+              <p:txBody>
+                <a:bodyPr rtlCol="0" anchor="ctr"/>
+                <a:lstStyle/>
+                <a:p>
+                  <a:pPr algn="ctr"/>
+                  <a:endParaRPr lang="fr-FR"/>
+                </a:p>
+              </p:txBody>
+            </p:sp>
+            <p:sp>
+              <p:nvSpPr>
+                <p:cNvPr id="26" name="ZoneTexte 25"/>
+                <p:cNvSpPr txBox="1"/>
+                <p:nvPr/>
+              </p:nvSpPr>
+              <p:spPr>
+                <a:xfrm>
+                  <a:off x="5462291" y="6933495"/>
+                  <a:ext cx="1460476" cy="261610"/>
+                </a:xfrm>
+                <a:prstGeom prst="rect">
+                  <a:avLst/>
+                </a:prstGeom>
+                <a:noFill/>
+              </p:spPr>
+              <p:txBody>
+                <a:bodyPr wrap="square" rtlCol="0">
+                  <a:spAutoFit/>
+                </a:bodyPr>
+                <a:lstStyle/>
+                <a:p>
+                  <a:r>
+                    <a:rPr lang="fr-FR" sz="1100" b="1" dirty="0" smtClean="0">
+                      <a:latin typeface="Arial" panose="020B0604020202020204" pitchFamily="34" charset="0"/>
+                      <a:cs typeface="Arial" panose="020B0604020202020204" pitchFamily="34" charset="0"/>
+                    </a:rPr>
+                    <a:t>BRUVS </a:t>
+                  </a:r>
+                  <a:r>
+                    <a:rPr lang="fr-FR" sz="1100" b="1" dirty="0" err="1" smtClean="0">
+                      <a:latin typeface="Arial" panose="020B0604020202020204" pitchFamily="34" charset="0"/>
+                      <a:cs typeface="Arial" panose="020B0604020202020204" pitchFamily="34" charset="0"/>
+                    </a:rPr>
+                    <a:t>samples</a:t>
+                  </a:r>
+                  <a:endParaRPr lang="fr-FR" sz="1100" b="1" dirty="0">
+                    <a:latin typeface="Arial" panose="020B0604020202020204" pitchFamily="34" charset="0"/>
+                    <a:cs typeface="Arial" panose="020B0604020202020204" pitchFamily="34" charset="0"/>
+                  </a:endParaRPr>
+                </a:p>
+              </p:txBody>
+            </p:sp>
+          </p:grpSp>
+          <p:grpSp>
+            <p:nvGrpSpPr>
+              <p:cNvPr id="31" name="Groupe 30"/>
+              <p:cNvGrpSpPr/>
+              <p:nvPr/>
+            </p:nvGrpSpPr>
+            <p:grpSpPr>
+              <a:xfrm>
+                <a:off x="9144000" y="4306790"/>
+                <a:ext cx="1940723" cy="261610"/>
+                <a:chOff x="5354291" y="7150807"/>
+                <a:chExt cx="1940723" cy="261610"/>
+              </a:xfrm>
+            </p:grpSpPr>
+            <p:sp>
+              <p:nvSpPr>
+                <p:cNvPr id="25" name="Ellipse 24"/>
+                <p:cNvSpPr/>
+                <p:nvPr/>
+              </p:nvSpPr>
+              <p:spPr>
+                <a:xfrm>
+                  <a:off x="5354291" y="7227612"/>
+                  <a:ext cx="108000" cy="108000"/>
+                </a:xfrm>
+                <a:prstGeom prst="ellipse">
+                  <a:avLst/>
+                </a:prstGeom>
+                <a:noFill/>
+                <a:ln>
+                  <a:solidFill>
+                    <a:schemeClr val="tx1"/>
+                  </a:solidFill>
+                </a:ln>
+              </p:spPr>
+              <p:style>
+                <a:lnRef idx="2">
+                  <a:schemeClr val="accent1">
+                    <a:shade val="50000"/>
+                  </a:schemeClr>
+                </a:lnRef>
+                <a:fillRef idx="1">
+                  <a:schemeClr val="accent1"/>
+                </a:fillRef>
+                <a:effectRef idx="0">
+                  <a:schemeClr val="accent1"/>
+                </a:effectRef>
+                <a:fontRef idx="minor">
+                  <a:schemeClr val="lt1"/>
+                </a:fontRef>
+              </p:style>
+              <p:txBody>
+                <a:bodyPr rtlCol="0" anchor="ctr"/>
+                <a:lstStyle/>
+                <a:p>
+                  <a:pPr algn="ctr"/>
+                  <a:endParaRPr lang="fr-FR"/>
+                </a:p>
+              </p:txBody>
+            </p:sp>
+            <p:sp>
+              <p:nvSpPr>
+                <p:cNvPr id="28" name="ZoneTexte 27"/>
+                <p:cNvSpPr txBox="1"/>
+                <p:nvPr/>
+              </p:nvSpPr>
+              <p:spPr>
+                <a:xfrm>
+                  <a:off x="5462291" y="7150807"/>
+                  <a:ext cx="1832723" cy="261610"/>
+                </a:xfrm>
+                <a:prstGeom prst="rect">
+                  <a:avLst/>
+                </a:prstGeom>
+                <a:noFill/>
+              </p:spPr>
+              <p:txBody>
+                <a:bodyPr wrap="square" rtlCol="0">
+                  <a:spAutoFit/>
+                </a:bodyPr>
+                <a:lstStyle/>
+                <a:p>
+                  <a:r>
+                    <a:rPr lang="fr-FR" sz="1100" b="1" dirty="0" smtClean="0">
+                      <a:latin typeface="Arial" panose="020B0604020202020204" pitchFamily="34" charset="0"/>
+                      <a:cs typeface="Arial" panose="020B0604020202020204" pitchFamily="34" charset="0"/>
+                    </a:rPr>
+                    <a:t>eDNA </a:t>
+                  </a:r>
+                  <a:r>
+                    <a:rPr lang="fr-FR" sz="1100" b="1" dirty="0" err="1" smtClean="0">
+                      <a:latin typeface="Arial" panose="020B0604020202020204" pitchFamily="34" charset="0"/>
+                      <a:cs typeface="Arial" panose="020B0604020202020204" pitchFamily="34" charset="0"/>
+                    </a:rPr>
+                    <a:t>samples</a:t>
+                  </a:r>
+                  <a:endParaRPr lang="fr-FR" sz="1100" b="1" dirty="0">
+                    <a:latin typeface="Arial" panose="020B0604020202020204" pitchFamily="34" charset="0"/>
+                    <a:cs typeface="Arial" panose="020B0604020202020204" pitchFamily="34" charset="0"/>
+                  </a:endParaRPr>
+                </a:p>
+              </p:txBody>
+            </p:sp>
+          </p:grpSp>
+          <p:grpSp>
+            <p:nvGrpSpPr>
+              <p:cNvPr id="32" name="Groupe 31"/>
+              <p:cNvGrpSpPr/>
+              <p:nvPr/>
+            </p:nvGrpSpPr>
+            <p:grpSpPr>
+              <a:xfrm>
+                <a:off x="9144000" y="4641273"/>
+                <a:ext cx="1961449" cy="261610"/>
+                <a:chOff x="6974243" y="6933495"/>
+                <a:chExt cx="1961449" cy="261610"/>
+              </a:xfrm>
+            </p:grpSpPr>
+            <p:sp>
+              <p:nvSpPr>
+                <p:cNvPr id="29" name="Ellipse 28"/>
+                <p:cNvSpPr/>
+                <p:nvPr/>
+              </p:nvSpPr>
+              <p:spPr>
+                <a:xfrm>
+                  <a:off x="6974243" y="7028300"/>
+                  <a:ext cx="72000" cy="72000"/>
+                </a:xfrm>
+                <a:prstGeom prst="ellipse">
+                  <a:avLst/>
+                </a:prstGeom>
+                <a:solidFill>
+                  <a:schemeClr val="tx1"/>
+                </a:solidFill>
+                <a:ln>
+                  <a:solidFill>
+                    <a:schemeClr val="tx1"/>
+                  </a:solidFill>
+                </a:ln>
+              </p:spPr>
+              <p:style>
+                <a:lnRef idx="2">
+                  <a:schemeClr val="accent1">
+                    <a:shade val="50000"/>
+                  </a:schemeClr>
+                </a:lnRef>
+                <a:fillRef idx="1">
+                  <a:schemeClr val="accent1"/>
+                </a:fillRef>
+                <a:effectRef idx="0">
+                  <a:schemeClr val="accent1"/>
+                </a:effectRef>
+                <a:fontRef idx="minor">
+                  <a:schemeClr val="lt1"/>
+                </a:fontRef>
+              </p:style>
+              <p:txBody>
+                <a:bodyPr rtlCol="0" anchor="ctr"/>
+                <a:lstStyle/>
+                <a:p>
+                  <a:pPr algn="ctr"/>
+                  <a:endParaRPr lang="fr-FR"/>
+                </a:p>
+              </p:txBody>
+            </p:sp>
+            <p:sp>
+              <p:nvSpPr>
+                <p:cNvPr id="30" name="ZoneTexte 29"/>
+                <p:cNvSpPr txBox="1"/>
+                <p:nvPr/>
+              </p:nvSpPr>
+              <p:spPr>
+                <a:xfrm>
+                  <a:off x="7040222" y="6933495"/>
+                  <a:ext cx="1895470" cy="261610"/>
+                </a:xfrm>
+                <a:prstGeom prst="rect">
+                  <a:avLst/>
+                </a:prstGeom>
+                <a:noFill/>
+              </p:spPr>
+              <p:txBody>
+                <a:bodyPr wrap="square" rtlCol="0">
+                  <a:spAutoFit/>
+                </a:bodyPr>
+                <a:lstStyle/>
+                <a:p>
+                  <a:r>
+                    <a:rPr lang="fr-FR" sz="1100" b="1" dirty="0" err="1" smtClean="0">
+                      <a:latin typeface="Arial" panose="020B0604020202020204" pitchFamily="34" charset="0"/>
+                      <a:cs typeface="Arial" panose="020B0604020202020204" pitchFamily="34" charset="0"/>
+                    </a:rPr>
+                    <a:t>Acoustic</a:t>
+                  </a:r>
+                  <a:r>
+                    <a:rPr lang="fr-FR" sz="1100" b="1" dirty="0" smtClean="0">
+                      <a:latin typeface="Arial" panose="020B0604020202020204" pitchFamily="34" charset="0"/>
+                      <a:cs typeface="Arial" panose="020B0604020202020204" pitchFamily="34" charset="0"/>
+                    </a:rPr>
+                    <a:t> </a:t>
+                  </a:r>
+                  <a:r>
+                    <a:rPr lang="fr-FR" sz="1100" b="1" dirty="0" err="1" smtClean="0">
+                      <a:latin typeface="Arial" panose="020B0604020202020204" pitchFamily="34" charset="0"/>
+                      <a:cs typeface="Arial" panose="020B0604020202020204" pitchFamily="34" charset="0"/>
+                    </a:rPr>
+                    <a:t>recordings</a:t>
+                  </a:r>
+                  <a:endParaRPr lang="fr-FR" sz="1100" b="1" dirty="0">
+                    <a:latin typeface="Arial" panose="020B0604020202020204" pitchFamily="34" charset="0"/>
+                    <a:cs typeface="Arial" panose="020B0604020202020204" pitchFamily="34" charset="0"/>
+                  </a:endParaRPr>
+                </a:p>
+              </p:txBody>
+            </p:sp>
+          </p:grpSp>
+          <p:sp>
+            <p:nvSpPr>
+              <p:cNvPr id="38" name="ZoneTexte 37"/>
+              <p:cNvSpPr txBox="1"/>
+              <p:nvPr/>
+            </p:nvSpPr>
+            <p:spPr>
+              <a:xfrm>
+                <a:off x="9059917" y="3614074"/>
+                <a:ext cx="1303283" cy="307777"/>
+              </a:xfrm>
+              <a:prstGeom prst="rect">
+                <a:avLst/>
+              </a:prstGeom>
+              <a:noFill/>
+            </p:spPr>
+            <p:txBody>
+              <a:bodyPr wrap="square" rtlCol="0">
+                <a:spAutoFit/>
+              </a:bodyPr>
+              <a:lstStyle/>
+              <a:p>
+                <a:r>
+                  <a:rPr lang="fr-FR" sz="1400" b="1" u="sng" dirty="0" smtClean="0">
+                    <a:latin typeface="Arial" panose="020B0604020202020204" pitchFamily="34" charset="0"/>
+                    <a:cs typeface="Arial" panose="020B0604020202020204" pitchFamily="34" charset="0"/>
+                  </a:rPr>
+                  <a:t>Sample type</a:t>
+                </a:r>
+                <a:endParaRPr lang="fr-FR" sz="1400" b="1" u="sng" dirty="0">
+                  <a:latin typeface="Arial" panose="020B0604020202020204" pitchFamily="34" charset="0"/>
+                  <a:cs typeface="Arial" panose="020B0604020202020204" pitchFamily="34" charset="0"/>
+                </a:endParaRPr>
+              </a:p>
+            </p:txBody>
+          </p:sp>
+        </p:grpSp>
+      </p:grpSp>
+    </p:spTree>
+    <p:extLst>
+      <p:ext uri="{BB962C8B-B14F-4D97-AF65-F5344CB8AC3E}">
+        <p14:creationId xmlns:p14="http://schemas.microsoft.com/office/powerpoint/2010/main" val="3385519225"/>
       </p:ext>
     </p:extLst>
   </p:cSld>

</xml_diff>

<commit_message>
update figures for publication
</commit_message>
<xml_diff>
--- a/06_Figures/Figures.pptx
+++ b/06_Figures/Figures.pptx
@@ -249,7 +249,7 @@
           <a:p>
             <a:fld id="{3FF39126-F987-48DB-9EEF-9CD00B9E823D}" type="datetimeFigureOut">
               <a:rPr lang="fr-FR" smtClean="0"/>
-              <a:t>06/03/2024</a:t>
+              <a:t>24/07/2024</a:t>
             </a:fld>
             <a:endParaRPr lang="fr-FR"/>
           </a:p>
@@ -419,7 +419,7 @@
           <a:p>
             <a:fld id="{3FF39126-F987-48DB-9EEF-9CD00B9E823D}" type="datetimeFigureOut">
               <a:rPr lang="fr-FR" smtClean="0"/>
-              <a:t>06/03/2024</a:t>
+              <a:t>24/07/2024</a:t>
             </a:fld>
             <a:endParaRPr lang="fr-FR"/>
           </a:p>
@@ -599,7 +599,7 @@
           <a:p>
             <a:fld id="{3FF39126-F987-48DB-9EEF-9CD00B9E823D}" type="datetimeFigureOut">
               <a:rPr lang="fr-FR" smtClean="0"/>
-              <a:t>06/03/2024</a:t>
+              <a:t>24/07/2024</a:t>
             </a:fld>
             <a:endParaRPr lang="fr-FR"/>
           </a:p>
@@ -769,7 +769,7 @@
           <a:p>
             <a:fld id="{3FF39126-F987-48DB-9EEF-9CD00B9E823D}" type="datetimeFigureOut">
               <a:rPr lang="fr-FR" smtClean="0"/>
-              <a:t>06/03/2024</a:t>
+              <a:t>24/07/2024</a:t>
             </a:fld>
             <a:endParaRPr lang="fr-FR"/>
           </a:p>
@@ -1013,7 +1013,7 @@
           <a:p>
             <a:fld id="{3FF39126-F987-48DB-9EEF-9CD00B9E823D}" type="datetimeFigureOut">
               <a:rPr lang="fr-FR" smtClean="0"/>
-              <a:t>06/03/2024</a:t>
+              <a:t>24/07/2024</a:t>
             </a:fld>
             <a:endParaRPr lang="fr-FR"/>
           </a:p>
@@ -1245,7 +1245,7 @@
           <a:p>
             <a:fld id="{3FF39126-F987-48DB-9EEF-9CD00B9E823D}" type="datetimeFigureOut">
               <a:rPr lang="fr-FR" smtClean="0"/>
-              <a:t>06/03/2024</a:t>
+              <a:t>24/07/2024</a:t>
             </a:fld>
             <a:endParaRPr lang="fr-FR"/>
           </a:p>
@@ -1612,7 +1612,7 @@
           <a:p>
             <a:fld id="{3FF39126-F987-48DB-9EEF-9CD00B9E823D}" type="datetimeFigureOut">
               <a:rPr lang="fr-FR" smtClean="0"/>
-              <a:t>06/03/2024</a:t>
+              <a:t>24/07/2024</a:t>
             </a:fld>
             <a:endParaRPr lang="fr-FR"/>
           </a:p>
@@ -1730,7 +1730,7 @@
           <a:p>
             <a:fld id="{3FF39126-F987-48DB-9EEF-9CD00B9E823D}" type="datetimeFigureOut">
               <a:rPr lang="fr-FR" smtClean="0"/>
-              <a:t>06/03/2024</a:t>
+              <a:t>24/07/2024</a:t>
             </a:fld>
             <a:endParaRPr lang="fr-FR"/>
           </a:p>
@@ -1825,7 +1825,7 @@
           <a:p>
             <a:fld id="{3FF39126-F987-48DB-9EEF-9CD00B9E823D}" type="datetimeFigureOut">
               <a:rPr lang="fr-FR" smtClean="0"/>
-              <a:t>06/03/2024</a:t>
+              <a:t>24/07/2024</a:t>
             </a:fld>
             <a:endParaRPr lang="fr-FR"/>
           </a:p>
@@ -2102,7 +2102,7 @@
           <a:p>
             <a:fld id="{3FF39126-F987-48DB-9EEF-9CD00B9E823D}" type="datetimeFigureOut">
               <a:rPr lang="fr-FR" smtClean="0"/>
-              <a:t>06/03/2024</a:t>
+              <a:t>24/07/2024</a:t>
             </a:fld>
             <a:endParaRPr lang="fr-FR"/>
           </a:p>
@@ -2359,7 +2359,7 @@
           <a:p>
             <a:fld id="{3FF39126-F987-48DB-9EEF-9CD00B9E823D}" type="datetimeFigureOut">
               <a:rPr lang="fr-FR" smtClean="0"/>
-              <a:t>06/03/2024</a:t>
+              <a:t>24/07/2024</a:t>
             </a:fld>
             <a:endParaRPr lang="fr-FR"/>
           </a:p>
@@ -2572,7 +2572,7 @@
           <a:p>
             <a:fld id="{3FF39126-F987-48DB-9EEF-9CD00B9E823D}" type="datetimeFigureOut">
               <a:rPr lang="fr-FR" smtClean="0"/>
-              <a:t>06/03/2024</a:t>
+              <a:t>24/07/2024</a:t>
             </a:fld>
             <a:endParaRPr lang="fr-FR"/>
           </a:p>
@@ -4348,9 +4348,9 @@
               <p:grpSpPr>
                 <a:xfrm>
                   <a:off x="329184" y="223114"/>
-                  <a:ext cx="5062118" cy="7983841"/>
+                  <a:ext cx="5062117" cy="7983841"/>
                   <a:chOff x="329184" y="223114"/>
-                  <a:chExt cx="5062118" cy="7983841"/>
+                  <a:chExt cx="5062117" cy="7983841"/>
                 </a:xfrm>
               </p:grpSpPr>
               <p:pic>
@@ -4375,7 +4375,7 @@
                 <p:spPr>
                   <a:xfrm>
                     <a:off x="329184" y="223114"/>
-                    <a:ext cx="5062118" cy="6327647"/>
+                    <a:ext cx="5062117" cy="6327647"/>
                   </a:xfrm>
                   <a:prstGeom prst="rect">
                     <a:avLst/>
@@ -6433,12 +6433,8 @@
             <a:lstStyle/>
             <a:p>
               <a:r>
-                <a:rPr lang="fr-FR" sz="1400" dirty="0" err="1"/>
-                <a:t>Modelling</a:t>
-              </a:r>
-              <a:r>
                 <a:rPr lang="fr-FR" sz="1400" dirty="0"/>
-                <a:t> </a:t>
+                <a:t>Modeling </a:t>
               </a:r>
               <a:r>
                 <a:rPr lang="fr-FR" sz="1400" dirty="0" err="1"/>
@@ -6487,12 +6483,8 @@
             <a:lstStyle/>
             <a:p>
               <a:r>
-                <a:rPr lang="fr-FR" sz="1400" dirty="0" err="1"/>
-                <a:t>Modelling</a:t>
-              </a:r>
-              <a:r>
                 <a:rPr lang="fr-FR" sz="1400" dirty="0"/>
-                <a:t> </a:t>
+                <a:t>Modeling </a:t>
               </a:r>
               <a:r>
                 <a:rPr lang="fr-FR" sz="1400" dirty="0" err="1"/>
@@ -9747,7 +9739,7 @@
             <p:spPr>
               <a:xfrm>
                 <a:off x="439950" y="1235240"/>
-                <a:ext cx="318052" cy="369332"/>
+                <a:ext cx="318052" cy="383906"/>
               </a:xfrm>
               <a:prstGeom prst="rect">
                 <a:avLst/>
@@ -9762,7 +9754,7 @@
               <a:p>
                 <a:r>
                   <a:rPr lang="fr-FR" b="1" dirty="0"/>
-                  <a:t>B</a:t>
+                  <a:t>b</a:t>
                 </a:r>
               </a:p>
             </p:txBody>
@@ -9834,7 +9826,7 @@
             <a:p>
               <a:r>
                 <a:rPr lang="fr-FR" b="1" dirty="0"/>
-                <a:t>A</a:t>
+                <a:t>a</a:t>
               </a:r>
             </a:p>
           </p:txBody>

</xml_diff>